<commit_message>
pdf of assignment1 generated
</commit_message>
<xml_diff>
--- a/docs/8547Saini/assignments/assignment1.pptx
+++ b/docs/8547Saini/assignments/assignment1.pptx
@@ -3372,12 +3372,12 @@
           <a:chExt cx="0" cy="0"/>
         </a:xfrm>
       </p:grpSpPr>
-      <p:sp>
+      <p:sp useBgFill="1">
         <p:nvSpPr>
-          <p:cNvPr id="7" name="Rectangle 6">
+          <p:cNvPr id="19" name="Rectangle 18">
             <a:extLst>
               <a:ext uri="{FF2B5EF4-FFF2-40B4-BE49-F238E27FC236}">
-                <a16:creationId xmlns:a16="http://schemas.microsoft.com/office/drawing/2014/main" id="{01C9CC24-B375-4226-BF2B-61FADBBA696A}"/>
+                <a16:creationId xmlns:a16="http://schemas.microsoft.com/office/drawing/2014/main" id="{3B854194-185D-494D-905C-7C7CB2E30F6E}"/>
               </a:ext>
               <a:ext uri="{C183D7F6-B498-43B3-948B-1728B52AA6E4}">
                 <adec:decorative xmlns:adec="http://schemas.microsoft.com/office/drawing/2017/decorative" val="1"/>
@@ -3397,15 +3397,12 @@
         </p:nvSpPr>
         <p:spPr>
           <a:xfrm>
-            <a:off x="0" y="0"/>
-            <a:ext cx="12192000" cy="6858000"/>
+            <a:off x="1" y="0"/>
+            <a:ext cx="6082110" cy="6858000"/>
           </a:xfrm>
           <a:prstGeom prst="rect">
             <a:avLst/>
           </a:prstGeom>
-          <a:solidFill>
-            <a:srgbClr val="FFFFFF"/>
-          </a:solidFill>
           <a:ln>
             <a:noFill/>
           </a:ln>
@@ -3437,10 +3434,10 @@
       </p:sp>
       <p:sp>
         <p:nvSpPr>
-          <p:cNvPr id="9" name="Rectangle 8">
+          <p:cNvPr id="21" name="Rectangle 20">
             <a:extLst>
               <a:ext uri="{FF2B5EF4-FFF2-40B4-BE49-F238E27FC236}">
-                <a16:creationId xmlns:a16="http://schemas.microsoft.com/office/drawing/2014/main" id="{CD70A28E-4FD8-4474-A206-E15B5EBB303F}"/>
+                <a16:creationId xmlns:a16="http://schemas.microsoft.com/office/drawing/2014/main" id="{B4F5FA0D-0104-4987-8241-EFF7C85B88DE}"/>
               </a:ext>
               <a:ext uri="{C183D7F6-B498-43B3-948B-1728B52AA6E4}">
                 <adec:decorative xmlns:adec="http://schemas.microsoft.com/office/drawing/2017/decorative" val="1"/>
@@ -3460,8 +3457,8 @@
         </p:nvSpPr>
         <p:spPr>
           <a:xfrm>
-            <a:off x="3048" y="1084747"/>
-            <a:ext cx="12188952" cy="3294207"/>
+            <a:off x="1" y="0"/>
+            <a:ext cx="12191998" cy="6858000"/>
           </a:xfrm>
           <a:prstGeom prst="rect">
             <a:avLst/>
@@ -3522,10 +3519,10 @@
       </p:sp>
       <p:pic>
         <p:nvPicPr>
-          <p:cNvPr id="14" name="Picture 10">
+          <p:cNvPr id="23" name="Picture 22">
             <a:extLst>
               <a:ext uri="{FF2B5EF4-FFF2-40B4-BE49-F238E27FC236}">
-                <a16:creationId xmlns:a16="http://schemas.microsoft.com/office/drawing/2014/main" id="{39647E21-5366-4638-AC97-D8CD4111EB57}"/>
+                <a16:creationId xmlns:a16="http://schemas.microsoft.com/office/drawing/2014/main" id="{2897127E-6CEF-446C-BE87-93B7C46E49D1}"/>
               </a:ext>
               <a:ext uri="{C183D7F6-B498-43B3-948B-1728B52AA6E4}">
                 <adec:decorative xmlns:adec="http://schemas.microsoft.com/office/drawing/2017/decorative" val="1"/>
@@ -3551,62 +3548,18 @@
               </a:ext>
             </a:extLst>
           </a:blip>
-          <a:srcRect l="8235" r="8214" b="45501"/>
           <a:stretch>
             <a:fillRect/>
           </a:stretch>
         </p:blipFill>
         <p:spPr>
-          <a:xfrm flipV="1">
+          <a:xfrm>
             <a:off x="0" y="0"/>
-            <a:ext cx="12191999" cy="4473360"/>
+            <a:ext cx="12192000" cy="6858000"/>
           </a:xfrm>
-          <a:custGeom>
+          <a:prstGeom prst="rect">
             <a:avLst/>
-            <a:gdLst>
-              <a:gd name="connsiteX0" fmla="*/ 0 w 12191999"/>
-              <a:gd name="connsiteY0" fmla="*/ 4473360 h 4473360"/>
-              <a:gd name="connsiteX1" fmla="*/ 12191999 w 12191999"/>
-              <a:gd name="connsiteY1" fmla="*/ 4473360 h 4473360"/>
-              <a:gd name="connsiteX2" fmla="*/ 12191999 w 12191999"/>
-              <a:gd name="connsiteY2" fmla="*/ 0 h 4473360"/>
-              <a:gd name="connsiteX3" fmla="*/ 0 w 12191999"/>
-              <a:gd name="connsiteY3" fmla="*/ 0 h 4473360"/>
-            </a:gdLst>
-            <a:ahLst/>
-            <a:cxnLst>
-              <a:cxn ang="0">
-                <a:pos x="connsiteX0" y="connsiteY0"/>
-              </a:cxn>
-              <a:cxn ang="0">
-                <a:pos x="connsiteX1" y="connsiteY1"/>
-              </a:cxn>
-              <a:cxn ang="0">
-                <a:pos x="connsiteX2" y="connsiteY2"/>
-              </a:cxn>
-              <a:cxn ang="0">
-                <a:pos x="connsiteX3" y="connsiteY3"/>
-              </a:cxn>
-            </a:cxnLst>
-            <a:rect l="l" t="t" r="r" b="b"/>
-            <a:pathLst>
-              <a:path w="12191999" h="4473360">
-                <a:moveTo>
-                  <a:pt x="0" y="4473360"/>
-                </a:moveTo>
-                <a:lnTo>
-                  <a:pt x="12191999" y="4473360"/>
-                </a:lnTo>
-                <a:lnTo>
-                  <a:pt x="12191999" y="0"/>
-                </a:lnTo>
-                <a:lnTo>
-                  <a:pt x="0" y="0"/>
-                </a:lnTo>
-                <a:close/>
-              </a:path>
-            </a:pathLst>
-          </a:custGeom>
+          </a:prstGeom>
         </p:spPr>
       </p:pic>
       <p:sp>
@@ -3627,8 +3580,8 @@
         </p:nvSpPr>
         <p:spPr>
           <a:xfrm>
-            <a:off x="753925" y="2076450"/>
-            <a:ext cx="10684151" cy="1345134"/>
+            <a:off x="640079" y="2053641"/>
+            <a:ext cx="3669161" cy="2760098"/>
           </a:xfrm>
         </p:spPr>
         <p:txBody>
@@ -3637,18 +3590,110 @@
           </a:bodyPr>
           <a:lstStyle/>
           <a:p>
-            <a:pPr algn="ctr"/>
             <a:r>
-              <a:rPr lang="en-GB" dirty="0">
+              <a:rPr lang="en-US" kern="1200">
                 <a:solidFill>
-                  <a:schemeClr val="bg1"/>
+                  <a:srgbClr val="FFFFFF"/>
                 </a:solidFill>
+                <a:latin typeface="+mj-lt"/>
+                <a:ea typeface="+mj-ea"/>
+                <a:cs typeface="+mj-cs"/>
               </a:rPr>
               <a:t>Assignment Lab 1</a:t>
             </a:r>
-            <a:endParaRPr lang="en-US" sz="5600" kern="1200" dirty="0">
+          </a:p>
+        </p:txBody>
+      </p:sp>
+      <p:sp>
+        <p:nvSpPr>
+          <p:cNvPr id="3" name="TextBox 2">
+            <a:extLst>
+              <a:ext uri="{FF2B5EF4-FFF2-40B4-BE49-F238E27FC236}">
+                <a16:creationId xmlns:a16="http://schemas.microsoft.com/office/drawing/2014/main" id="{C3119C66-688E-4099-B101-90CEAE033289}"/>
+              </a:ext>
+            </a:extLst>
+          </p:cNvPr>
+          <p:cNvSpPr txBox="1"/>
+          <p:nvPr/>
+        </p:nvSpPr>
+        <p:spPr>
+          <a:xfrm>
+            <a:off x="6090574" y="801866"/>
+            <a:ext cx="5306084" cy="5230634"/>
+          </a:xfrm>
+          <a:prstGeom prst="rect">
+            <a:avLst/>
+          </a:prstGeom>
+        </p:spPr>
+        <p:txBody>
+          <a:bodyPr vert="horz" lIns="91440" tIns="45720" rIns="91440" bIns="45720" rtlCol="0" anchor="ctr">
+            <a:normAutofit/>
+          </a:bodyPr>
+          <a:lstStyle/>
+          <a:p>
+            <a:pPr indent="-228600">
+              <a:lnSpc>
+                <a:spcPct val="90000"/>
+              </a:lnSpc>
+              <a:spcAft>
+                <a:spcPts val="600"/>
+              </a:spcAft>
+              <a:buFont typeface="Arial" panose="020B0604020202020204" pitchFamily="34" charset="0"/>
+              <a:buChar char="•"/>
+            </a:pPr>
+            <a:r>
+              <a:rPr lang="en-US" sz="2400" b="1" i="0" u="none" strike="noStrike" baseline="0" dirty="0">
+                <a:solidFill>
+                  <a:srgbClr val="000000"/>
+                </a:solidFill>
+              </a:rPr>
+              <a:t>Pledge: </a:t>
+            </a:r>
+            <a:r>
+              <a:rPr lang="en-US" sz="2400" b="0" i="0" u="none" strike="noStrike" baseline="0" dirty="0">
+                <a:solidFill>
+                  <a:srgbClr val="000000"/>
+                </a:solidFill>
+              </a:rPr>
+              <a:t>“As a student of the University of Windsor, I pledge to pursue all endeavors with honor and integrity and will not tolerate or engage in academic or personal dishonesty. I confirm that I have not received any unauthorized assistance in preparing for or writing this assignment. I acknowledge that a mark of 0 may be assigned for copied work</a:t>
+            </a:r>
+            <a:r>
+              <a:rPr lang="en-US" sz="2400" b="0" i="0" u="none" strike="noStrike" baseline="0">
+                <a:solidFill>
+                  <a:srgbClr val="000000"/>
+                </a:solidFill>
+              </a:rPr>
+              <a:t>.” </a:t>
+            </a:r>
+          </a:p>
+          <a:p>
+            <a:pPr algn="r">
+              <a:lnSpc>
+                <a:spcPct val="90000"/>
+              </a:lnSpc>
+              <a:spcAft>
+                <a:spcPts val="600"/>
+              </a:spcAft>
+            </a:pPr>
+            <a:r>
+              <a:rPr lang="en-US" sz="2400" b="0" i="0" u="none" strike="noStrike" baseline="0">
+                <a:solidFill>
+                  <a:srgbClr val="000000"/>
+                </a:solidFill>
+              </a:rPr>
+              <a:t> </a:t>
+            </a:r>
+            <a:r>
+              <a:rPr lang="en-US" sz="2400" b="0" i="0" u="none" strike="noStrike" baseline="0" dirty="0">
+                <a:solidFill>
+                  <a:srgbClr val="000000"/>
+                </a:solidFill>
+              </a:rPr>
+              <a:t>Wen Dong #110057395 </a:t>
+            </a:r>
+            <a:endParaRPr lang="en-US" sz="2400" dirty="0">
               <a:solidFill>
-                <a:schemeClr val="bg1"/>
+                <a:srgbClr val="000000"/>
               </a:solidFill>
             </a:endParaRPr>
           </a:p>
@@ -7437,7 +7482,7 @@
           <a:p>
             <a:r>
               <a:rPr lang="en-US" dirty="0"/>
-              <a:t>For 4.b (search), the tree is getting more and more balanced due to splaying along with search, so complexity is O(log n)</a:t>
+              <a:t>For 4.b (search), the tree is getting more and more balanced due to splaying along with searches, so complexity is O(log n)</a:t>
             </a:r>
           </a:p>
           <a:p>
@@ -8735,7 +8780,7 @@
           <a:p>
             <a:r>
               <a:rPr lang="en-US" dirty="0"/>
-              <a:t>For random inputs, average time for all are decent at average complexity O(log )</a:t>
+              <a:t>For random inputs, average time for all are decent at average complexity O(log n)</a:t>
             </a:r>
           </a:p>
         </p:txBody>
@@ -9958,12 +10003,8 @@
           <a:lstStyle/>
           <a:p>
             <a:r>
-              <a:rPr lang="en-US"/>
-              <a:t>we </a:t>
-            </a:r>
-            <a:r>
               <a:rPr lang="en-US" dirty="0"/>
-              <a:t>can see actions on all the tables are of average-time complexity O(log n), except Binary Search tree for sequential inputs which Performs at worst case O(n). For real problems, if the inputs are random data, I will choose Binary Search Tree or </a:t>
+              <a:t>we can see actions on all the tables are of average-time complexity O(log n), except Binary Search tree for sequential inputs which Performs at worst case O(n). For real problems, if the inputs are random data, I will choose Binary Search Tree or </a:t>
             </a:r>
             <a:r>
               <a:rPr lang="en-US" dirty="0" err="1"/>
@@ -10031,6 +10072,66 @@
           <a:chExt cx="0" cy="0"/>
         </a:xfrm>
       </p:grpSpPr>
+      <p:sp useBgFill="1">
+        <p:nvSpPr>
+          <p:cNvPr id="21" name="Rectangle 20">
+            <a:extLst>
+              <a:ext uri="{FF2B5EF4-FFF2-40B4-BE49-F238E27FC236}">
+                <a16:creationId xmlns:a16="http://schemas.microsoft.com/office/drawing/2014/main" id="{53F29798-D584-4792-9B62-3F5F5C36D619}"/>
+              </a:ext>
+              <a:ext uri="{C183D7F6-B498-43B3-948B-1728B52AA6E4}">
+                <adec:decorative xmlns:adec="http://schemas.microsoft.com/office/drawing/2017/decorative" val="1"/>
+              </a:ext>
+            </a:extLst>
+          </p:cNvPr>
+          <p:cNvSpPr>
+            <a:spLocks noGrp="1" noRot="1" noChangeAspect="1" noMove="1" noResize="1" noEditPoints="1" noAdjustHandles="1" noChangeArrowheads="1" noChangeShapeType="1" noTextEdit="1"/>
+          </p:cNvSpPr>
+          <p:nvPr>
+            <p:extLst>
+              <p:ext uri="{386F3935-93C4-4BCD-93E2-E3B085C9AB24}">
+                <p16:designElem xmlns:p16="http://schemas.microsoft.com/office/powerpoint/2015/main" val="1"/>
+              </p:ext>
+            </p:extLst>
+          </p:nvPr>
+        </p:nvSpPr>
+        <p:spPr>
+          <a:xfrm>
+            <a:off x="0" y="0"/>
+            <a:ext cx="12188952" cy="6858000"/>
+          </a:xfrm>
+          <a:prstGeom prst="rect">
+            <a:avLst/>
+          </a:prstGeom>
+          <a:ln>
+            <a:noFill/>
+          </a:ln>
+        </p:spPr>
+        <p:style>
+          <a:lnRef idx="2">
+            <a:schemeClr val="accent1">
+              <a:shade val="50000"/>
+            </a:schemeClr>
+          </a:lnRef>
+          <a:fillRef idx="1">
+            <a:schemeClr val="accent1"/>
+          </a:fillRef>
+          <a:effectRef idx="0">
+            <a:schemeClr val="accent1"/>
+          </a:effectRef>
+          <a:fontRef idx="minor">
+            <a:schemeClr val="lt1"/>
+          </a:fontRef>
+        </p:style>
+        <p:txBody>
+          <a:bodyPr rtlCol="0" anchor="ctr"/>
+          <a:lstStyle/>
+          <a:p>
+            <a:pPr algn="ctr"/>
+            <a:endParaRPr lang="en-US"/>
+          </a:p>
+        </p:txBody>
+      </p:sp>
       <p:sp>
         <p:nvSpPr>
           <p:cNvPr id="2" name="Title 1">
@@ -10049,8 +10150,8 @@
         </p:nvSpPr>
         <p:spPr>
           <a:xfrm>
-            <a:off x="648929" y="629266"/>
-            <a:ext cx="3990127" cy="4234965"/>
+            <a:off x="838200" y="184805"/>
+            <a:ext cx="10515600" cy="1505883"/>
           </a:xfrm>
         </p:spPr>
         <p:txBody>
@@ -10060,10 +10161,7 @@
           <a:lstStyle/>
           <a:p>
             <a:r>
-              <a:rPr lang="en-US" sz="3700" kern="1200" dirty="0">
-                <a:solidFill>
-                  <a:schemeClr val="tx1"/>
-                </a:solidFill>
+              <a:rPr lang="en-US" sz="2900" kern="1200">
                 <a:latin typeface="+mj-lt"/>
                 <a:ea typeface="+mj-ea"/>
                 <a:cs typeface="+mj-cs"/>
@@ -10071,20 +10169,14 @@
               <a:t>This is the source code structure corresponding to all the questions. </a:t>
             </a:r>
             <a:br>
-              <a:rPr lang="en-US" sz="3700" kern="1200" dirty="0">
-                <a:solidFill>
-                  <a:schemeClr val="tx1"/>
-                </a:solidFill>
+              <a:rPr lang="en-US" sz="2900" kern="1200">
                 <a:latin typeface="+mj-lt"/>
                 <a:ea typeface="+mj-ea"/>
                 <a:cs typeface="+mj-cs"/>
               </a:rPr>
             </a:br>
             <a:r>
-              <a:rPr lang="en-US" sz="3700" kern="1200" dirty="0" err="1">
-                <a:solidFill>
-                  <a:schemeClr val="tx1"/>
-                </a:solidFill>
+              <a:rPr lang="en-US" sz="2900" kern="1200">
                 <a:highlight>
                   <a:srgbClr val="00FF00"/>
                 </a:highlight>
@@ -10095,53 +10187,22 @@
               <a:t>a</a:t>
             </a:r>
             <a:r>
-              <a:rPr lang="en-US" sz="3700" kern="1200" dirty="0" err="1">
-                <a:solidFill>
-                  <a:schemeClr val="tx1"/>
-                </a:solidFill>
+              <a:rPr lang="en-US" sz="2900" kern="1200">
                 <a:latin typeface="+mj-lt"/>
                 <a:ea typeface="+mj-ea"/>
                 <a:cs typeface="+mj-cs"/>
               </a:rPr>
-              <a:t>.</a:t>
-            </a:r>
-            <a:r>
-              <a:rPr lang="en-US" sz="2800" kern="1200" dirty="0" err="1">
-                <a:solidFill>
-                  <a:schemeClr val="tx1"/>
-                </a:solidFill>
-                <a:latin typeface="+mj-lt"/>
-                <a:ea typeface="+mj-ea"/>
-                <a:cs typeface="+mj-cs"/>
-              </a:rPr>
-              <a:t>Run</a:t>
-            </a:r>
-            <a:r>
-              <a:rPr lang="en-US" sz="2800" kern="1200" dirty="0">
-                <a:solidFill>
-                  <a:schemeClr val="tx1"/>
-                </a:solidFill>
-                <a:latin typeface="+mj-lt"/>
-                <a:ea typeface="+mj-ea"/>
-                <a:cs typeface="+mj-cs"/>
-              </a:rPr>
-              <a:t> TestHashTales.java for questions 1-3;</a:t>
+              <a:t>.Run TestHashTales.java for questions 1-3;</a:t>
             </a:r>
             <a:br>
-              <a:rPr lang="en-US" sz="2800" kern="1200" dirty="0">
-                <a:solidFill>
-                  <a:schemeClr val="tx1"/>
-                </a:solidFill>
+              <a:rPr lang="en-US" sz="2900" kern="1200">
                 <a:latin typeface="+mj-lt"/>
                 <a:ea typeface="+mj-ea"/>
                 <a:cs typeface="+mj-cs"/>
               </a:rPr>
             </a:br>
             <a:r>
-              <a:rPr lang="en-US" sz="2800" kern="1200" dirty="0">
-                <a:solidFill>
-                  <a:schemeClr val="tx1"/>
-                </a:solidFill>
+              <a:rPr lang="en-US" sz="2900" kern="1200">
                 <a:highlight>
                   <a:srgbClr val="FF0000"/>
                 </a:highlight>
@@ -10152,10 +10213,7 @@
               <a:t>b</a:t>
             </a:r>
             <a:r>
-              <a:rPr lang="en-US" sz="2800" kern="1200" dirty="0">
-                <a:solidFill>
-                  <a:schemeClr val="tx1"/>
-                </a:solidFill>
+              <a:rPr lang="en-US" sz="2900" kern="1200">
                 <a:latin typeface="+mj-lt"/>
                 <a:ea typeface="+mj-ea"/>
                 <a:cs typeface="+mj-cs"/>
@@ -10165,6 +10223,36 @@
           </a:p>
         </p:txBody>
       </p:sp>
+      <p:pic>
+        <p:nvPicPr>
+          <p:cNvPr id="10" name="Picture 9">
+            <a:extLst>
+              <a:ext uri="{FF2B5EF4-FFF2-40B4-BE49-F238E27FC236}">
+                <a16:creationId xmlns:a16="http://schemas.microsoft.com/office/drawing/2014/main" id="{C3426E54-33A4-425C-90FC-5B3C4850CB3B}"/>
+              </a:ext>
+            </a:extLst>
+          </p:cNvPr>
+          <p:cNvPicPr>
+            <a:picLocks noChangeAspect="1"/>
+          </p:cNvPicPr>
+          <p:nvPr/>
+        </p:nvPicPr>
+        <p:blipFill>
+          <a:blip r:embed="rId2"/>
+          <a:stretch>
+            <a:fillRect/>
+          </a:stretch>
+        </p:blipFill>
+        <p:spPr>
+          <a:xfrm>
+            <a:off x="838200" y="1849802"/>
+            <a:ext cx="10512547" cy="4441551"/>
+          </a:xfrm>
+          <a:prstGeom prst="rect">
+            <a:avLst/>
+          </a:prstGeom>
+        </p:spPr>
+      </p:pic>
       <p:sp>
         <p:nvSpPr>
           <p:cNvPr id="6" name="TextBox 5">
@@ -10204,173 +10292,6 @@
           </a:p>
         </p:txBody>
       </p:sp>
-      <p:sp>
-        <p:nvSpPr>
-          <p:cNvPr id="15" name="Rectangle 10">
-            <a:extLst>
-              <a:ext uri="{FF2B5EF4-FFF2-40B4-BE49-F238E27FC236}">
-                <a16:creationId xmlns:a16="http://schemas.microsoft.com/office/drawing/2014/main" id="{5E39A796-BE83-48B1-B33F-35C4A32AAB57}"/>
-              </a:ext>
-              <a:ext uri="{C183D7F6-B498-43B3-948B-1728B52AA6E4}">
-                <adec:decorative xmlns:adec="http://schemas.microsoft.com/office/drawing/2017/decorative" val="1"/>
-              </a:ext>
-            </a:extLst>
-          </p:cNvPr>
-          <p:cNvSpPr>
-            <a:spLocks noGrp="1" noRot="1" noChangeAspect="1" noMove="1" noResize="1" noEditPoints="1" noAdjustHandles="1" noChangeArrowheads="1" noChangeShapeType="1" noTextEdit="1"/>
-          </p:cNvSpPr>
-          <p:nvPr>
-            <p:extLst>
-              <p:ext uri="{386F3935-93C4-4BCD-93E2-E3B085C9AB24}">
-                <p16:designElem xmlns:p16="http://schemas.microsoft.com/office/powerpoint/2015/main" val="1"/>
-              </p:ext>
-            </p:extLst>
-          </p:nvPr>
-        </p:nvSpPr>
-        <p:spPr>
-          <a:xfrm>
-            <a:off x="4639056" y="0"/>
-            <a:ext cx="7552944" cy="6858000"/>
-          </a:xfrm>
-          <a:prstGeom prst="rect">
-            <a:avLst/>
-          </a:prstGeom>
-          <a:solidFill>
-            <a:srgbClr val="C8CACA"/>
-          </a:solidFill>
-          <a:ln>
-            <a:noFill/>
-          </a:ln>
-        </p:spPr>
-        <p:style>
-          <a:lnRef idx="2">
-            <a:schemeClr val="accent1">
-              <a:shade val="50000"/>
-            </a:schemeClr>
-          </a:lnRef>
-          <a:fillRef idx="1">
-            <a:schemeClr val="accent1"/>
-          </a:fillRef>
-          <a:effectRef idx="0">
-            <a:schemeClr val="accent1"/>
-          </a:effectRef>
-          <a:fontRef idx="minor">
-            <a:schemeClr val="lt1"/>
-          </a:fontRef>
-        </p:style>
-        <p:txBody>
-          <a:bodyPr rtlCol="0" anchor="ctr"/>
-          <a:lstStyle/>
-          <a:p>
-            <a:pPr algn="ctr"/>
-            <a:endParaRPr lang="en-US"/>
-          </a:p>
-        </p:txBody>
-      </p:sp>
-      <p:sp>
-        <p:nvSpPr>
-          <p:cNvPr id="16" name="Rounded Rectangle 9">
-            <a:extLst>
-              <a:ext uri="{FF2B5EF4-FFF2-40B4-BE49-F238E27FC236}">
-                <a16:creationId xmlns:a16="http://schemas.microsoft.com/office/drawing/2014/main" id="{72F84B47-E267-4194-8194-831DB7B5547F}"/>
-              </a:ext>
-              <a:ext uri="{C183D7F6-B498-43B3-948B-1728B52AA6E4}">
-                <adec:decorative xmlns:adec="http://schemas.microsoft.com/office/drawing/2017/decorative" val="1"/>
-              </a:ext>
-            </a:extLst>
-          </p:cNvPr>
-          <p:cNvSpPr>
-            <a:spLocks noGrp="1" noRot="1" noChangeAspect="1" noMove="1" noResize="1" noEditPoints="1" noAdjustHandles="1" noChangeArrowheads="1" noChangeShapeType="1" noTextEdit="1"/>
-          </p:cNvSpPr>
-          <p:nvPr>
-            <p:extLst>
-              <p:ext uri="{386F3935-93C4-4BCD-93E2-E3B085C9AB24}">
-                <p16:designElem xmlns:p16="http://schemas.microsoft.com/office/powerpoint/2015/main" val="1"/>
-              </p:ext>
-            </p:extLst>
-          </p:nvPr>
-        </p:nvSpPr>
-        <p:spPr>
-          <a:xfrm>
-            <a:off x="5123688" y="557784"/>
-            <a:ext cx="6584098" cy="5739187"/>
-          </a:xfrm>
-          <a:prstGeom prst="roundRect">
-            <a:avLst>
-              <a:gd name="adj" fmla="val 0"/>
-            </a:avLst>
-          </a:prstGeom>
-          <a:solidFill>
-            <a:srgbClr val="FFFFFF"/>
-          </a:solidFill>
-          <a:ln w="9525">
-            <a:solidFill>
-              <a:srgbClr val="C8CACA"/>
-            </a:solidFill>
-          </a:ln>
-          <a:effectLst>
-            <a:outerShdw blurRad="57150" dist="19050" dir="5400000" algn="t" rotWithShape="0">
-              <a:prstClr val="black">
-                <a:alpha val="63000"/>
-              </a:prstClr>
-            </a:outerShdw>
-          </a:effectLst>
-        </p:spPr>
-        <p:style>
-          <a:lnRef idx="2">
-            <a:schemeClr val="accent1">
-              <a:shade val="50000"/>
-            </a:schemeClr>
-          </a:lnRef>
-          <a:fillRef idx="1">
-            <a:schemeClr val="accent1"/>
-          </a:fillRef>
-          <a:effectRef idx="0">
-            <a:schemeClr val="accent1"/>
-          </a:effectRef>
-          <a:fontRef idx="minor">
-            <a:schemeClr val="lt1"/>
-          </a:fontRef>
-        </p:style>
-        <p:txBody>
-          <a:bodyPr rtlCol="0" anchor="ctr"/>
-          <a:lstStyle/>
-          <a:p>
-            <a:pPr algn="ctr"/>
-            <a:endParaRPr lang="en-US"/>
-          </a:p>
-        </p:txBody>
-      </p:sp>
-      <p:pic>
-        <p:nvPicPr>
-          <p:cNvPr id="8" name="Picture 7">
-            <a:extLst>
-              <a:ext uri="{FF2B5EF4-FFF2-40B4-BE49-F238E27FC236}">
-                <a16:creationId xmlns:a16="http://schemas.microsoft.com/office/drawing/2014/main" id="{7D394C09-41D2-4E31-9662-CD9E6499F6AB}"/>
-              </a:ext>
-            </a:extLst>
-          </p:cNvPr>
-          <p:cNvPicPr>
-            <a:picLocks noChangeAspect="1"/>
-          </p:cNvPicPr>
-          <p:nvPr/>
-        </p:nvPicPr>
-        <p:blipFill>
-          <a:blip r:embed="rId2"/>
-          <a:stretch>
-            <a:fillRect/>
-          </a:stretch>
-        </p:blipFill>
-        <p:spPr>
-          <a:xfrm>
-            <a:off x="5352644" y="629266"/>
-            <a:ext cx="5105400" cy="2638425"/>
-          </a:xfrm>
-          <a:prstGeom prst="rect">
-            <a:avLst/>
-          </a:prstGeom>
-        </p:spPr>
-      </p:pic>
     </p:spTree>
     <p:extLst>
       <p:ext uri="{BB962C8B-B14F-4D97-AF65-F5344CB8AC3E}">
@@ -10502,7 +10423,7 @@
             </a:r>
             <a:r>
               <a:rPr lang="en-US" sz="2000" dirty="0" err="1"/>
-              <a:t>SCh</a:t>
+              <a:t>SpCh</a:t>
             </a:r>
             <a:r>
               <a:rPr lang="en-US" sz="2000" dirty="0"/>

</xml_diff>